<commit_message>
Including Final Demo Evaluation Rubric
</commit_message>
<xml_diff>
--- a/Week11-12/FinalDemo_slides/FinalDemo_1.pptx
+++ b/Week11-12/FinalDemo_slides/FinalDemo_1.pptx
@@ -120,6 +120,43 @@
     </p:ext>
   </p:extLst>
 </p:presentation>
+</file>
+
+<file path=ppt/revisionInfo.xml><?xml version="1.0" encoding="utf-8"?>
+<p1510:revInfo xmlns:a="http://schemas.openxmlformats.org/drawingml/2006/main" xmlns:r="http://schemas.openxmlformats.org/officeDocument/2006/relationships" xmlns:p1510="http://schemas.microsoft.com/office/powerpoint/2015/10/main">
+  <p1510:revLst>
+    <p1510:client id="{4BD231F2-1C98-4F68-80D5-D7AB56D433D2}" v="7" dt="2024-10-07T07:21:06.459"/>
+  </p1510:revLst>
+</p1510:revInfo>
+</file>
+
+<file path=ppt/changesInfos/changesInfo1.xml><?xml version="1.0" encoding="utf-8"?>
+<pc:chgInfo xmlns:a="http://schemas.openxmlformats.org/drawingml/2006/main" xmlns:r="http://schemas.openxmlformats.org/officeDocument/2006/relationships" xmlns:ac="http://schemas.microsoft.com/office/drawing/2013/main/command" xmlns:pc="http://schemas.microsoft.com/office/powerpoint/2013/main/command">
+  <pc:docChgLst>
+    <pc:chgData name="Morris Gu" userId="69bc5ac2-d614-4924-b186-b5a72bcb1b0c" providerId="ADAL" clId="{4BD231F2-1C98-4F68-80D5-D7AB56D433D2}"/>
+    <pc:docChg chg="modSld">
+      <pc:chgData name="Morris Gu" userId="69bc5ac2-d614-4924-b186-b5a72bcb1b0c" providerId="ADAL" clId="{4BD231F2-1C98-4F68-80D5-D7AB56D433D2}" dt="2024-10-07T07:21:29.839" v="56" actId="113"/>
+      <pc:docMkLst>
+        <pc:docMk/>
+      </pc:docMkLst>
+      <pc:sldChg chg="modSp mod">
+        <pc:chgData name="Morris Gu" userId="69bc5ac2-d614-4924-b186-b5a72bcb1b0c" providerId="ADAL" clId="{4BD231F2-1C98-4F68-80D5-D7AB56D433D2}" dt="2024-10-07T07:21:29.839" v="56" actId="113"/>
+        <pc:sldMkLst>
+          <pc:docMk/>
+          <pc:sldMk cId="86247891" sldId="277"/>
+        </pc:sldMkLst>
+        <pc:spChg chg="mod">
+          <ac:chgData name="Morris Gu" userId="69bc5ac2-d614-4924-b186-b5a72bcb1b0c" providerId="ADAL" clId="{4BD231F2-1C98-4F68-80D5-D7AB56D433D2}" dt="2024-10-07T07:21:29.839" v="56" actId="113"/>
+          <ac:spMkLst>
+            <pc:docMk/>
+            <pc:sldMk cId="86247891" sldId="277"/>
+            <ac:spMk id="4" creationId="{CA0B27D3-7B85-4485-A10E-AAC012A9B3BB}"/>
+          </ac:spMkLst>
+        </pc:spChg>
+      </pc:sldChg>
+    </pc:docChg>
+  </pc:docChgLst>
+</pc:chgInfo>
 </file>
 
 <file path=ppt/notesMasters/notesMaster1.xml><?xml version="1.0" encoding="utf-8"?>
@@ -7736,46 +7773,509 @@
           <a:chExt cx="0" cy="0"/>
         </a:xfrm>
       </p:grpSpPr>
-      <p:sp>
-        <p:nvSpPr>
-          <p:cNvPr id="4" name="TextBox 3">
-            <a:extLst>
-              <a:ext uri="{FF2B5EF4-FFF2-40B4-BE49-F238E27FC236}">
-                <a16:creationId xmlns:a16="http://schemas.microsoft.com/office/drawing/2014/main" id="{CA0B27D3-7B85-4485-A10E-AAC012A9B3BB}"/>
-              </a:ext>
-            </a:extLst>
-          </p:cNvPr>
-          <p:cNvSpPr txBox="1"/>
-          <p:nvPr/>
-        </p:nvSpPr>
-        <p:spPr>
-          <a:xfrm>
-            <a:off x="478180" y="723232"/>
-            <a:ext cx="11588314" cy="338554"/>
-          </a:xfrm>
-          <a:prstGeom prst="rect">
-            <a:avLst/>
-          </a:prstGeom>
-          <a:noFill/>
-        </p:spPr>
-        <p:txBody>
-          <a:bodyPr wrap="square" rtlCol="0">
-            <a:spAutoFit/>
-          </a:bodyPr>
-          <a:lstStyle/>
-          <a:p>
-            <a:r>
-              <a:rPr lang="en-AU" sz="1600" dirty="0"/>
-              <a:t>Update to the final demo evaluation is still being updated. Please hold </a:t>
-            </a:r>
-            <a:r>
-              <a:rPr lang="en-AU" sz="1600"/>
-              <a:t>on tight!</a:t>
-            </a:r>
-            <a:endParaRPr lang="en-AU" sz="1600" dirty="0"/>
-          </a:p>
-        </p:txBody>
-      </p:sp>
+      <mc:AlternateContent xmlns:mc="http://schemas.openxmlformats.org/markup-compatibility/2006">
+        <mc:Choice xmlns:a14="http://schemas.microsoft.com/office/drawing/2010/main" Requires="a14">
+          <p:sp>
+            <p:nvSpPr>
+              <p:cNvPr id="4" name="TextBox 3">
+                <a:extLst>
+                  <a:ext uri="{FF2B5EF4-FFF2-40B4-BE49-F238E27FC236}">
+                    <a16:creationId xmlns:a16="http://schemas.microsoft.com/office/drawing/2014/main" id="{CA0B27D3-7B85-4485-A10E-AAC012A9B3BB}"/>
+                  </a:ext>
+                </a:extLst>
+              </p:cNvPr>
+              <p:cNvSpPr txBox="1"/>
+              <p:nvPr/>
+            </p:nvSpPr>
+            <p:spPr>
+              <a:xfrm>
+                <a:off x="478180" y="723232"/>
+                <a:ext cx="11588314" cy="5338256"/>
+              </a:xfrm>
+              <a:prstGeom prst="rect">
+                <a:avLst/>
+              </a:prstGeom>
+              <a:noFill/>
+            </p:spPr>
+            <p:txBody>
+              <a:bodyPr wrap="square" rtlCol="0">
+                <a:spAutoFit/>
+              </a:bodyPr>
+              <a:lstStyle/>
+              <a:p>
+                <a:r>
+                  <a:rPr lang="en-US" sz="1600" dirty="0"/>
+                  <a:t>Mapping (60 points):</a:t>
+                </a:r>
+              </a:p>
+              <a:p>
+                <a:r>
+                  <a:rPr lang="en-US" sz="1600" dirty="0"/>
+                  <a:t>	</a:t>
+                </a:r>
+                <a:r>
+                  <a:rPr lang="en-US" sz="1600" dirty="0" err="1"/>
+                  <a:t>ArUco</a:t>
+                </a:r>
+                <a:r>
+                  <a:rPr lang="en-US" sz="1600" dirty="0"/>
+                  <a:t> slam map (0 ≤ </a:t>
+                </a:r>
+                <a:r>
+                  <a:rPr lang="en-US" sz="1600" dirty="0" err="1"/>
+                  <a:t>slam_score</a:t>
+                </a:r>
+                <a:r>
+                  <a:rPr lang="en-US" sz="1600" dirty="0"/>
+                  <a:t> ≤ 30pt): </a:t>
+                </a:r>
+              </a:p>
+              <a:p>
+                <a:pPr algn="ctr"/>
+                <a:r>
+                  <a:rPr lang="en-US" sz="1600" dirty="0"/>
+                  <a:t>		</a:t>
+                </a:r>
+                <a14:m>
+                  <m:oMath xmlns:m="http://schemas.openxmlformats.org/officeDocument/2006/math">
+                    <m:r>
+                      <a:rPr lang="en-US" sz="1600" i="1">
+                        <a:latin typeface="Cambria Math" panose="02040503050406030204" pitchFamily="18" charset="0"/>
+                      </a:rPr>
+                      <m:t>2</m:t>
+                    </m:r>
+                    <m:r>
+                      <a:rPr lang="en-AU" sz="1600" b="0" i="1" smtClean="0">
+                        <a:latin typeface="Cambria Math" panose="02040503050406030204" pitchFamily="18" charset="0"/>
+                      </a:rPr>
+                      <m:t>4</m:t>
+                    </m:r>
+                    <m:r>
+                      <a:rPr lang="en-US" sz="1600" b="0" i="1" smtClean="0">
+                        <a:latin typeface="Cambria Math" panose="02040503050406030204" pitchFamily="18" charset="0"/>
+                      </a:rPr>
+                      <m:t>∗</m:t>
+                    </m:r>
+                    <m:f>
+                      <m:fPr>
+                        <m:ctrlPr>
+                          <a:rPr lang="en-US" sz="1600" i="1" smtClean="0">
+                            <a:latin typeface="Cambria Math" panose="02040503050406030204" pitchFamily="18" charset="0"/>
+                          </a:rPr>
+                        </m:ctrlPr>
+                      </m:fPr>
+                      <m:num>
+                        <m:r>
+                          <m:rPr>
+                            <m:nor/>
+                          </m:rPr>
+                          <a:rPr lang="en-GB" sz="1600" b="0" i="0" dirty="0" smtClean="0"/>
+                          <m:t>0.12</m:t>
+                        </m:r>
+                        <m:r>
+                          <m:rPr>
+                            <m:nor/>
+                          </m:rPr>
+                          <a:rPr lang="en-AU" sz="1600" b="0" i="0" dirty="0" smtClean="0"/>
+                          <m:t> </m:t>
+                        </m:r>
+                        <m:r>
+                          <m:rPr>
+                            <m:nor/>
+                          </m:rPr>
+                          <a:rPr lang="en-US" sz="1600" dirty="0"/>
+                          <m:t>− </m:t>
+                        </m:r>
+                        <m:r>
+                          <m:rPr>
+                            <m:nor/>
+                          </m:rPr>
+                          <a:rPr lang="en-US" sz="1600" dirty="0"/>
+                          <m:t>Aligned</m:t>
+                        </m:r>
+                        <m:r>
+                          <m:rPr>
+                            <m:nor/>
+                          </m:rPr>
+                          <a:rPr lang="en-US" sz="1600" dirty="0"/>
+                          <m:t>_</m:t>
+                        </m:r>
+                        <m:r>
+                          <m:rPr>
+                            <m:nor/>
+                          </m:rPr>
+                          <a:rPr lang="en-US" sz="1600" dirty="0"/>
+                          <m:t>RMSE</m:t>
+                        </m:r>
+                      </m:num>
+                      <m:den>
+                        <m:r>
+                          <m:rPr>
+                            <m:nor/>
+                          </m:rPr>
+                          <a:rPr lang="en-GB" sz="1600" b="0" i="0" dirty="0" smtClean="0"/>
+                          <m:t>0.12</m:t>
+                        </m:r>
+                        <m:r>
+                          <m:rPr>
+                            <m:nor/>
+                          </m:rPr>
+                          <a:rPr lang="en-US" sz="1600" dirty="0"/>
+                          <m:t>− 0.02</m:t>
+                        </m:r>
+                      </m:den>
+                    </m:f>
+                    <m:r>
+                      <m:rPr>
+                        <m:nor/>
+                      </m:rPr>
+                      <a:rPr lang="en-AU" sz="1600" b="0" i="0" dirty="0" smtClean="0">
+                        <a:latin typeface="Cambria Math" panose="02040503050406030204" pitchFamily="18" charset="0"/>
+                      </a:rPr>
+                      <m:t> </m:t>
+                    </m:r>
+                    <m:r>
+                      <m:rPr>
+                        <m:nor/>
+                      </m:rPr>
+                      <a:rPr lang="en-US" sz="1600" dirty="0"/>
+                      <m:t>+</m:t>
+                    </m:r>
+                    <m:r>
+                      <m:rPr>
+                        <m:nor/>
+                      </m:rPr>
+                      <a:rPr lang="en-AU" sz="1600" b="0" i="0" dirty="0" smtClean="0"/>
+                      <m:t> </m:t>
+                    </m:r>
+                    <m:r>
+                      <m:rPr>
+                        <m:nor/>
+                      </m:rPr>
+                      <a:rPr lang="en-US" sz="1600" b="0" i="0" dirty="0" smtClean="0"/>
+                      <m:t>0.</m:t>
+                    </m:r>
+                    <m:r>
+                      <m:rPr>
+                        <m:nor/>
+                      </m:rPr>
+                      <a:rPr lang="en-AU" sz="1600" b="0" i="0" dirty="0" smtClean="0"/>
+                      <m:t>6</m:t>
+                    </m:r>
+                    <m:r>
+                      <m:rPr>
+                        <m:nor/>
+                      </m:rPr>
+                      <a:rPr lang="en-US" sz="1600" b="0" i="0" dirty="0" smtClean="0"/>
+                      <m:t> ∗ </m:t>
+                    </m:r>
+                    <m:r>
+                      <m:rPr>
+                        <m:nor/>
+                      </m:rPr>
+                      <a:rPr lang="en-US" sz="1600" dirty="0"/>
+                      <m:t>NumberOfFoundMarkers</m:t>
+                    </m:r>
+                  </m:oMath>
+                </a14:m>
+                <a:endParaRPr lang="en-US" sz="1200" dirty="0"/>
+              </a:p>
+              <a:p>
+                <a:r>
+                  <a:rPr lang="en-US" sz="1600" dirty="0"/>
+                  <a:t>	Target map (0 ≤ </a:t>
+                </a:r>
+                <a:r>
+                  <a:rPr lang="en-US" sz="1600" dirty="0" err="1"/>
+                  <a:t>target_est_score</a:t>
+                </a:r>
+                <a:r>
+                  <a:rPr lang="en-US" sz="1600" dirty="0"/>
+                  <a:t> ≤ 30pt): </a:t>
+                </a:r>
+                <a:r>
+                  <a:rPr lang="en-US" sz="1600" b="1" dirty="0"/>
+                  <a:t>(Note the upper bound has now changed to 30cm)</a:t>
+                </a:r>
+              </a:p>
+              <a:p>
+                <a:pPr algn="ctr"/>
+                <a:r>
+                  <a:rPr lang="en-US" sz="1600" dirty="0"/>
+                  <a:t>	</a:t>
+                </a:r>
+                <a:r>
+                  <a:rPr lang="en-US" sz="1600" dirty="0" err="1"/>
+                  <a:t>TargetScore</a:t>
+                </a:r>
+                <a:r>
+                  <a:rPr lang="en-US" sz="1600" dirty="0"/>
+                  <a:t>[object] </a:t>
+                </a:r>
+                <a14:m>
+                  <m:oMath xmlns:m="http://schemas.openxmlformats.org/officeDocument/2006/math">
+                    <m:r>
+                      <a:rPr lang="en-GB" sz="1600" b="0" i="0" smtClean="0">
+                        <a:latin typeface="Cambria Math" panose="02040503050406030204" pitchFamily="18" charset="0"/>
+                      </a:rPr>
+                      <m:t>=</m:t>
+                    </m:r>
+                    <m:r>
+                      <a:rPr lang="en-AU" sz="1600" b="0" i="1" smtClean="0">
+                        <a:latin typeface="Cambria Math" panose="02040503050406030204" pitchFamily="18" charset="0"/>
+                      </a:rPr>
+                      <m:t>3</m:t>
+                    </m:r>
+                    <m:r>
+                      <a:rPr lang="en-US" sz="1600" b="0" i="1" smtClean="0">
+                        <a:latin typeface="Cambria Math" panose="02040503050406030204" pitchFamily="18" charset="0"/>
+                      </a:rPr>
+                      <m:t>∗</m:t>
+                    </m:r>
+                    <m:f>
+                      <m:fPr>
+                        <m:ctrlPr>
+                          <a:rPr lang="en-US" sz="1600" i="1" smtClean="0">
+                            <a:latin typeface="Cambria Math" panose="02040503050406030204" pitchFamily="18" charset="0"/>
+                          </a:rPr>
+                        </m:ctrlPr>
+                      </m:fPr>
+                      <m:num>
+                        <m:r>
+                          <m:rPr>
+                            <m:nor/>
+                          </m:rPr>
+                          <a:rPr lang="en-AU" sz="1600" b="0" i="0" smtClean="0">
+                            <a:latin typeface="Cambria Math" panose="02040503050406030204" pitchFamily="18" charset="0"/>
+                          </a:rPr>
+                          <m:t>0.3 </m:t>
+                        </m:r>
+                        <m:r>
+                          <m:rPr>
+                            <m:nor/>
+                          </m:rPr>
+                          <a:rPr lang="en-US" sz="1600" dirty="0"/>
+                          <m:t>−</m:t>
+                        </m:r>
+                        <m:r>
+                          <m:rPr>
+                            <m:nor/>
+                          </m:rPr>
+                          <a:rPr lang="en-AU" sz="1600" b="0" i="0" dirty="0" smtClean="0"/>
+                          <m:t> </m:t>
+                        </m:r>
+                        <m:r>
+                          <m:rPr>
+                            <m:nor/>
+                          </m:rPr>
+                          <a:rPr lang="en-US" sz="1600" dirty="0"/>
+                          <m:t>estimation</m:t>
+                        </m:r>
+                        <m:r>
+                          <m:rPr>
+                            <m:nor/>
+                          </m:rPr>
+                          <a:rPr lang="en-US" sz="1600" dirty="0"/>
+                          <m:t>_</m:t>
+                        </m:r>
+                        <m:r>
+                          <m:rPr>
+                            <m:nor/>
+                          </m:rPr>
+                          <a:rPr lang="en-US" sz="1600" dirty="0"/>
+                          <m:t>error</m:t>
+                        </m:r>
+                        <m:r>
+                          <m:rPr>
+                            <m:nor/>
+                          </m:rPr>
+                          <a:rPr lang="en-GB" sz="1600" b="0" i="0" dirty="0" smtClean="0"/>
+                          <m:t>[</m:t>
+                        </m:r>
+                        <m:r>
+                          <m:rPr>
+                            <m:nor/>
+                          </m:rPr>
+                          <a:rPr lang="en-GB" sz="1600" b="0" i="0" dirty="0" smtClean="0"/>
+                          <m:t>object</m:t>
+                        </m:r>
+                        <m:r>
+                          <m:rPr>
+                            <m:nor/>
+                          </m:rPr>
+                          <a:rPr lang="en-GB" sz="1600" b="0" i="0" dirty="0" smtClean="0"/>
+                          <m:t>]</m:t>
+                        </m:r>
+                      </m:num>
+                      <m:den>
+                        <m:r>
+                          <m:rPr>
+                            <m:nor/>
+                          </m:rPr>
+                          <a:rPr lang="en-AU" sz="1600" b="0" i="0" dirty="0" smtClean="0"/>
+                          <m:t>0.3 </m:t>
+                        </m:r>
+                        <m:r>
+                          <m:rPr>
+                            <m:nor/>
+                          </m:rPr>
+                          <a:rPr lang="en-US" sz="1600" b="0" i="0" dirty="0" smtClean="0"/>
+                          <m:t>− 0.025</m:t>
+                        </m:r>
+                      </m:den>
+                    </m:f>
+                  </m:oMath>
+                </a14:m>
+                <a:endParaRPr lang="en-US" sz="1600" dirty="0"/>
+              </a:p>
+              <a:p>
+                <a:pPr algn="ctr"/>
+                <a:r>
+                  <a:rPr lang="en-US" sz="1600" dirty="0" err="1"/>
+                  <a:t>TargetEstScore</a:t>
+                </a:r>
+                <a:r>
+                  <a:rPr lang="en-US" sz="1600" dirty="0"/>
+                  <a:t> = sum(</a:t>
+                </a:r>
+                <a:r>
+                  <a:rPr lang="en-US" sz="1600" dirty="0" err="1"/>
+                  <a:t>TargetScore</a:t>
+                </a:r>
+                <a:r>
+                  <a:rPr lang="en-US" sz="1600" dirty="0"/>
+                  <a:t>)</a:t>
+                </a:r>
+              </a:p>
+              <a:p>
+                <a:r>
+                  <a:rPr lang="en-US" sz="1600" dirty="0"/>
+                  <a:t>	Mapping score (0 ≤ </a:t>
+                </a:r>
+                <a:r>
+                  <a:rPr lang="en-US" sz="1600" dirty="0" err="1"/>
+                  <a:t>map_score</a:t>
+                </a:r>
+                <a:r>
+                  <a:rPr lang="en-US" sz="1600" dirty="0"/>
+                  <a:t> ≤ 60pt) = </a:t>
+                </a:r>
+                <a:r>
+                  <a:rPr lang="en-US" sz="1600" dirty="0" err="1"/>
+                  <a:t>slam_score</a:t>
+                </a:r>
+                <a:r>
+                  <a:rPr lang="en-US" sz="1600" dirty="0"/>
+                  <a:t> + </a:t>
+                </a:r>
+                <a:r>
+                  <a:rPr lang="en-US" sz="1600" dirty="0" err="1"/>
+                  <a:t>target_est_score</a:t>
+                </a:r>
+                <a:endParaRPr lang="en-US" sz="1600" dirty="0"/>
+              </a:p>
+              <a:p>
+                <a:r>
+                  <a:rPr lang="en-US" sz="1600" dirty="0"/>
+                  <a:t>Waypoint navigation (max 15 points):</a:t>
+                </a:r>
+              </a:p>
+              <a:p>
+                <a:r>
+                  <a:rPr lang="en-US" sz="1600" dirty="0"/>
+                  <a:t>	2pts for each success navigation. 5pts for code or demo evidence.</a:t>
+                </a:r>
+              </a:p>
+              <a:p>
+                <a:endParaRPr lang="en-US" sz="1600" dirty="0"/>
+              </a:p>
+              <a:p>
+                <a:r>
+                  <a:rPr lang="en-US" sz="1600" dirty="0"/>
+                  <a:t>Full auto navigation (max 40 points):</a:t>
+                </a:r>
+              </a:p>
+              <a:p>
+                <a:r>
+                  <a:rPr lang="en-US" sz="1600" dirty="0"/>
+                  <a:t>	6pts for each success navigation. 10pts total for code or demo evidence (includes 5 pts for waypoint navigation and 5 pts for path planning).</a:t>
+                </a:r>
+              </a:p>
+              <a:p>
+                <a:r>
+                  <a:rPr lang="en-US" sz="1600" dirty="0"/>
+                  <a:t>	</a:t>
+                </a:r>
+              </a:p>
+              <a:p>
+                <a:r>
+                  <a:rPr lang="en-US" sz="1600" dirty="0"/>
+                  <a:t>Penalties (Max of 5 penalties total, 4 applied):</a:t>
+                </a:r>
+              </a:p>
+              <a:p>
+                <a:r>
+                  <a:rPr lang="en-US" sz="1600" dirty="0"/>
+                  <a:t>	-3 (or -2 if you perform semi auto navigation) points for object collisions or leaving boundary (Does not apply to evidence marks)</a:t>
+                </a:r>
+              </a:p>
+              <a:p>
+                <a:endParaRPr lang="en-US" sz="1600" dirty="0"/>
+              </a:p>
+              <a:p>
+                <a:r>
+                  <a:rPr lang="en-US" sz="1600" dirty="0"/>
+                  <a:t>Marks for reaching objects will always count, however you cannot stop a run manually until a run is qualified (same definition as M4)</a:t>
+                </a:r>
+              </a:p>
+            </p:txBody>
+          </p:sp>
+        </mc:Choice>
+        <mc:Fallback>
+          <p:sp>
+            <p:nvSpPr>
+              <p:cNvPr id="4" name="TextBox 3">
+                <a:extLst>
+                  <a:ext uri="{FF2B5EF4-FFF2-40B4-BE49-F238E27FC236}">
+                    <a16:creationId xmlns:a16="http://schemas.microsoft.com/office/drawing/2014/main" id="{CA0B27D3-7B85-4485-A10E-AAC012A9B3BB}"/>
+                  </a:ext>
+                </a:extLst>
+              </p:cNvPr>
+              <p:cNvSpPr txBox="1">
+                <a:spLocks noRot="1" noChangeAspect="1" noMove="1" noResize="1" noEditPoints="1" noAdjustHandles="1" noChangeArrowheads="1" noChangeShapeType="1" noTextEdit="1"/>
+              </p:cNvSpPr>
+              <p:nvPr/>
+            </p:nvSpPr>
+            <p:spPr>
+              <a:xfrm>
+                <a:off x="478180" y="723232"/>
+                <a:ext cx="11588314" cy="5338256"/>
+              </a:xfrm>
+              <a:prstGeom prst="rect">
+                <a:avLst/>
+              </a:prstGeom>
+              <a:blipFill>
+                <a:blip r:embed="rId2"/>
+                <a:stretch>
+                  <a:fillRect l="-263" t="-343" r="-316" b="-571"/>
+                </a:stretch>
+              </a:blipFill>
+            </p:spPr>
+            <p:txBody>
+              <a:bodyPr/>
+              <a:lstStyle/>
+              <a:p>
+                <a:r>
+                  <a:rPr lang="en-AU">
+                    <a:noFill/>
+                  </a:rPr>
+                  <a:t> </a:t>
+                </a:r>
+              </a:p>
+            </p:txBody>
+          </p:sp>
+        </mc:Fallback>
+      </mc:AlternateContent>
       <p:sp>
         <p:nvSpPr>
           <p:cNvPr id="5" name="TextBox 4">

</xml_diff>